<commit_message>
change state code and test
</commit_message>
<xml_diff>
--- a/moore_machine_yosys/out.pptx
+++ b/moore_machine_yosys/out.pptx
@@ -11,23 +11,27 @@
     <p:sldId id="256" r:id="rId6"/>
     <p:sldId id="257" r:id="rId7"/>
     <p:sldId id="258" r:id="rId8"/>
+    <p:sldId id="259" r:id="rId9"/>
+    <p:sldId id="260" r:id="rId10"/>
+    <p:sldId id="261" r:id="rId11"/>
+    <p:sldId id="262" r:id="rId12"/>
   </p:sldIdLst>
   <p:sldSz cy="5143500" cx="9144000"/>
   <p:notesSz cx="6858000" cy="9144000"/>
   <p:embeddedFontLst>
     <p:embeddedFont>
       <p:font typeface="Raleway"/>
-      <p:regular r:id="rId9"/>
-      <p:bold r:id="rId10"/>
-      <p:italic r:id="rId11"/>
-      <p:boldItalic r:id="rId12"/>
-    </p:embeddedFont>
-    <p:embeddedFont>
-      <p:font typeface="Lato"/>
       <p:regular r:id="rId13"/>
       <p:bold r:id="rId14"/>
       <p:italic r:id="rId15"/>
       <p:boldItalic r:id="rId16"/>
+    </p:embeddedFont>
+    <p:embeddedFont>
+      <p:font typeface="Lato"/>
+      <p:regular r:id="rId17"/>
+      <p:bold r:id="rId18"/>
+      <p:italic r:id="rId19"/>
+      <p:boldItalic r:id="rId20"/>
     </p:embeddedFont>
   </p:embeddedFontLst>
   <p:defaultTextStyle>
@@ -957,6 +961,402 @@
       <p:sp>
         <p:nvSpPr>
           <p:cNvPr id="145" name="Google Shape;145;g2a8963d5f1f_0_14:notes"/>
+          <p:cNvSpPr txBox="1"/>
+          <p:nvPr>
+            <p:ph idx="1" type="body"/>
+          </p:nvPr>
+        </p:nvSpPr>
+        <p:spPr>
+          <a:xfrm>
+            <a:off x="685800" y="4343400"/>
+            <a:ext cx="5486400" cy="4114800"/>
+          </a:xfrm>
+          <a:prstGeom prst="rect">
+            <a:avLst/>
+          </a:prstGeom>
+        </p:spPr>
+        <p:txBody>
+          <a:bodyPr anchorCtr="0" anchor="t" bIns="91425" lIns="91425" spcFirstLastPara="1" rIns="91425" wrap="square" tIns="91425">
+            <a:noAutofit/>
+          </a:bodyPr>
+          <a:lstStyle/>
+          <a:p>
+            <a:pPr indent="0" lvl="0" marL="0" rtl="0" algn="l">
+              <a:spcBef>
+                <a:spcPts val="0"/>
+              </a:spcBef>
+              <a:spcAft>
+                <a:spcPts val="0"/>
+              </a:spcAft>
+              <a:buNone/>
+            </a:pPr>
+            <a:r>
+              <a:t/>
+            </a:r>
+            <a:endParaRPr/>
+          </a:p>
+        </p:txBody>
+      </p:sp>
+    </p:spTree>
+  </p:cSld>
+  <p:clrMapOvr>
+    <a:masterClrMapping/>
+  </p:clrMapOvr>
+</p:notes>
+</file>
+
+<file path=ppt/notesSlides/notesSlide4.xml><?xml version="1.0" encoding="utf-8"?>
+<p:notes xmlns:a="http://schemas.openxmlformats.org/drawingml/2006/main" xmlns:r="http://schemas.openxmlformats.org/officeDocument/2006/relationships" xmlns:mc="http://schemas.openxmlformats.org/markup-compatibility/2006" xmlns:mv="urn:schemas-microsoft-com:mac:vml" xmlns:p="http://schemas.openxmlformats.org/presentationml/2006/main" xmlns:c="http://schemas.openxmlformats.org/drawingml/2006/chart" xmlns:dgm="http://schemas.openxmlformats.org/drawingml/2006/diagram" xmlns:o="urn:schemas-microsoft-com:office:office" xmlns:v="urn:schemas-microsoft-com:vml" xmlns:pvml="urn:schemas-microsoft-com:office:powerpoint" xmlns:com="http://schemas.openxmlformats.org/drawingml/2006/compatibility" xmlns:p14="http://schemas.microsoft.com/office/powerpoint/2010/main" xmlns:p15="http://schemas.microsoft.com/office/powerpoint/2012/main" xmlns:ahyp="http://schemas.microsoft.com/office/drawing/2018/hyperlinkcolor" showMasterPhAnim="0" showMasterSp="0">
+  <p:cSld>
+    <p:spTree>
+      <p:nvGrpSpPr>
+        <p:cNvPr id="149" name="Shape 149"/>
+        <p:cNvGrpSpPr/>
+        <p:nvPr/>
+      </p:nvGrpSpPr>
+      <p:grpSpPr>
+        <a:xfrm>
+          <a:off x="0" y="0"/>
+          <a:ext cx="0" cy="0"/>
+          <a:chOff x="0" y="0"/>
+          <a:chExt cx="0" cy="0"/>
+        </a:xfrm>
+      </p:grpSpPr>
+      <p:sp>
+        <p:nvSpPr>
+          <p:cNvPr id="150" name="Google Shape;150;g2a92bd0c23d_0_0:notes"/>
+          <p:cNvSpPr/>
+          <p:nvPr>
+            <p:ph idx="2" type="sldImg"/>
+          </p:nvPr>
+        </p:nvSpPr>
+        <p:spPr>
+          <a:xfrm>
+            <a:off x="381300" y="685800"/>
+            <a:ext cx="6096000" cy="3429000"/>
+          </a:xfrm>
+          <a:custGeom>
+            <a:rect b="b" l="l" r="r" t="t"/>
+            <a:pathLst>
+              <a:path extrusionOk="0" h="120000" w="120000">
+                <a:moveTo>
+                  <a:pt x="0" y="0"/>
+                </a:moveTo>
+                <a:lnTo>
+                  <a:pt x="120000" y="0"/>
+                </a:lnTo>
+                <a:lnTo>
+                  <a:pt x="120000" y="120000"/>
+                </a:lnTo>
+                <a:lnTo>
+                  <a:pt x="0" y="120000"/>
+                </a:lnTo>
+                <a:close/>
+              </a:path>
+            </a:pathLst>
+          </a:custGeom>
+        </p:spPr>
+      </p:sp>
+      <p:sp>
+        <p:nvSpPr>
+          <p:cNvPr id="151" name="Google Shape;151;g2a92bd0c23d_0_0:notes"/>
+          <p:cNvSpPr txBox="1"/>
+          <p:nvPr>
+            <p:ph idx="1" type="body"/>
+          </p:nvPr>
+        </p:nvSpPr>
+        <p:spPr>
+          <a:xfrm>
+            <a:off x="685800" y="4343400"/>
+            <a:ext cx="5486400" cy="4114800"/>
+          </a:xfrm>
+          <a:prstGeom prst="rect">
+            <a:avLst/>
+          </a:prstGeom>
+        </p:spPr>
+        <p:txBody>
+          <a:bodyPr anchorCtr="0" anchor="t" bIns="91425" lIns="91425" spcFirstLastPara="1" rIns="91425" wrap="square" tIns="91425">
+            <a:noAutofit/>
+          </a:bodyPr>
+          <a:lstStyle/>
+          <a:p>
+            <a:pPr indent="0" lvl="0" marL="0" rtl="0" algn="l">
+              <a:spcBef>
+                <a:spcPts val="0"/>
+              </a:spcBef>
+              <a:spcAft>
+                <a:spcPts val="0"/>
+              </a:spcAft>
+              <a:buNone/>
+            </a:pPr>
+            <a:r>
+              <a:t/>
+            </a:r>
+            <a:endParaRPr/>
+          </a:p>
+        </p:txBody>
+      </p:sp>
+    </p:spTree>
+  </p:cSld>
+  <p:clrMapOvr>
+    <a:masterClrMapping/>
+  </p:clrMapOvr>
+</p:notes>
+</file>
+
+<file path=ppt/notesSlides/notesSlide5.xml><?xml version="1.0" encoding="utf-8"?>
+<p:notes xmlns:a="http://schemas.openxmlformats.org/drawingml/2006/main" xmlns:r="http://schemas.openxmlformats.org/officeDocument/2006/relationships" xmlns:mc="http://schemas.openxmlformats.org/markup-compatibility/2006" xmlns:mv="urn:schemas-microsoft-com:mac:vml" xmlns:p="http://schemas.openxmlformats.org/presentationml/2006/main" xmlns:c="http://schemas.openxmlformats.org/drawingml/2006/chart" xmlns:dgm="http://schemas.openxmlformats.org/drawingml/2006/diagram" xmlns:o="urn:schemas-microsoft-com:office:office" xmlns:v="urn:schemas-microsoft-com:vml" xmlns:pvml="urn:schemas-microsoft-com:office:powerpoint" xmlns:com="http://schemas.openxmlformats.org/drawingml/2006/compatibility" xmlns:p14="http://schemas.microsoft.com/office/powerpoint/2010/main" xmlns:p15="http://schemas.microsoft.com/office/powerpoint/2012/main" xmlns:ahyp="http://schemas.microsoft.com/office/drawing/2018/hyperlinkcolor" showMasterPhAnim="0" showMasterSp="0">
+  <p:cSld>
+    <p:spTree>
+      <p:nvGrpSpPr>
+        <p:cNvPr id="157" name="Shape 157"/>
+        <p:cNvGrpSpPr/>
+        <p:nvPr/>
+      </p:nvGrpSpPr>
+      <p:grpSpPr>
+        <a:xfrm>
+          <a:off x="0" y="0"/>
+          <a:ext cx="0" cy="0"/>
+          <a:chOff x="0" y="0"/>
+          <a:chExt cx="0" cy="0"/>
+        </a:xfrm>
+      </p:grpSpPr>
+      <p:sp>
+        <p:nvSpPr>
+          <p:cNvPr id="158" name="Google Shape;158;g2a92bd0c23d_0_10:notes"/>
+          <p:cNvSpPr/>
+          <p:nvPr>
+            <p:ph idx="2" type="sldImg"/>
+          </p:nvPr>
+        </p:nvSpPr>
+        <p:spPr>
+          <a:xfrm>
+            <a:off x="381300" y="685800"/>
+            <a:ext cx="6096000" cy="3429000"/>
+          </a:xfrm>
+          <a:custGeom>
+            <a:rect b="b" l="l" r="r" t="t"/>
+            <a:pathLst>
+              <a:path extrusionOk="0" h="120000" w="120000">
+                <a:moveTo>
+                  <a:pt x="0" y="0"/>
+                </a:moveTo>
+                <a:lnTo>
+                  <a:pt x="120000" y="0"/>
+                </a:lnTo>
+                <a:lnTo>
+                  <a:pt x="120000" y="120000"/>
+                </a:lnTo>
+                <a:lnTo>
+                  <a:pt x="0" y="120000"/>
+                </a:lnTo>
+                <a:close/>
+              </a:path>
+            </a:pathLst>
+          </a:custGeom>
+        </p:spPr>
+      </p:sp>
+      <p:sp>
+        <p:nvSpPr>
+          <p:cNvPr id="159" name="Google Shape;159;g2a92bd0c23d_0_10:notes"/>
+          <p:cNvSpPr txBox="1"/>
+          <p:nvPr>
+            <p:ph idx="1" type="body"/>
+          </p:nvPr>
+        </p:nvSpPr>
+        <p:spPr>
+          <a:xfrm>
+            <a:off x="685800" y="4343400"/>
+            <a:ext cx="5486400" cy="4114800"/>
+          </a:xfrm>
+          <a:prstGeom prst="rect">
+            <a:avLst/>
+          </a:prstGeom>
+        </p:spPr>
+        <p:txBody>
+          <a:bodyPr anchorCtr="0" anchor="t" bIns="91425" lIns="91425" spcFirstLastPara="1" rIns="91425" wrap="square" tIns="91425">
+            <a:noAutofit/>
+          </a:bodyPr>
+          <a:lstStyle/>
+          <a:p>
+            <a:pPr indent="0" lvl="0" marL="0" rtl="0" algn="l">
+              <a:spcBef>
+                <a:spcPts val="0"/>
+              </a:spcBef>
+              <a:spcAft>
+                <a:spcPts val="0"/>
+              </a:spcAft>
+              <a:buNone/>
+            </a:pPr>
+            <a:r>
+              <a:t/>
+            </a:r>
+            <a:endParaRPr/>
+          </a:p>
+        </p:txBody>
+      </p:sp>
+    </p:spTree>
+  </p:cSld>
+  <p:clrMapOvr>
+    <a:masterClrMapping/>
+  </p:clrMapOvr>
+</p:notes>
+</file>
+
+<file path=ppt/notesSlides/notesSlide6.xml><?xml version="1.0" encoding="utf-8"?>
+<p:notes xmlns:a="http://schemas.openxmlformats.org/drawingml/2006/main" xmlns:r="http://schemas.openxmlformats.org/officeDocument/2006/relationships" xmlns:mc="http://schemas.openxmlformats.org/markup-compatibility/2006" xmlns:mv="urn:schemas-microsoft-com:mac:vml" xmlns:p="http://schemas.openxmlformats.org/presentationml/2006/main" xmlns:c="http://schemas.openxmlformats.org/drawingml/2006/chart" xmlns:dgm="http://schemas.openxmlformats.org/drawingml/2006/diagram" xmlns:o="urn:schemas-microsoft-com:office:office" xmlns:v="urn:schemas-microsoft-com:vml" xmlns:pvml="urn:schemas-microsoft-com:office:powerpoint" xmlns:com="http://schemas.openxmlformats.org/drawingml/2006/compatibility" xmlns:p14="http://schemas.microsoft.com/office/powerpoint/2010/main" xmlns:p15="http://schemas.microsoft.com/office/powerpoint/2012/main" xmlns:ahyp="http://schemas.microsoft.com/office/drawing/2018/hyperlinkcolor" showMasterPhAnim="0" showMasterSp="0">
+  <p:cSld>
+    <p:spTree>
+      <p:nvGrpSpPr>
+        <p:cNvPr id="163" name="Shape 163"/>
+        <p:cNvGrpSpPr/>
+        <p:nvPr/>
+      </p:nvGrpSpPr>
+      <p:grpSpPr>
+        <a:xfrm>
+          <a:off x="0" y="0"/>
+          <a:ext cx="0" cy="0"/>
+          <a:chOff x="0" y="0"/>
+          <a:chExt cx="0" cy="0"/>
+        </a:xfrm>
+      </p:grpSpPr>
+      <p:sp>
+        <p:nvSpPr>
+          <p:cNvPr id="164" name="Google Shape;164;g2a92bd0c23d_0_17:notes"/>
+          <p:cNvSpPr/>
+          <p:nvPr>
+            <p:ph idx="2" type="sldImg"/>
+          </p:nvPr>
+        </p:nvSpPr>
+        <p:spPr>
+          <a:xfrm>
+            <a:off x="381300" y="685800"/>
+            <a:ext cx="6096000" cy="3429000"/>
+          </a:xfrm>
+          <a:custGeom>
+            <a:rect b="b" l="l" r="r" t="t"/>
+            <a:pathLst>
+              <a:path extrusionOk="0" h="120000" w="120000">
+                <a:moveTo>
+                  <a:pt x="0" y="0"/>
+                </a:moveTo>
+                <a:lnTo>
+                  <a:pt x="120000" y="0"/>
+                </a:lnTo>
+                <a:lnTo>
+                  <a:pt x="120000" y="120000"/>
+                </a:lnTo>
+                <a:lnTo>
+                  <a:pt x="0" y="120000"/>
+                </a:lnTo>
+                <a:close/>
+              </a:path>
+            </a:pathLst>
+          </a:custGeom>
+        </p:spPr>
+      </p:sp>
+      <p:sp>
+        <p:nvSpPr>
+          <p:cNvPr id="165" name="Google Shape;165;g2a92bd0c23d_0_17:notes"/>
+          <p:cNvSpPr txBox="1"/>
+          <p:nvPr>
+            <p:ph idx="1" type="body"/>
+          </p:nvPr>
+        </p:nvSpPr>
+        <p:spPr>
+          <a:xfrm>
+            <a:off x="685800" y="4343400"/>
+            <a:ext cx="5486400" cy="4114800"/>
+          </a:xfrm>
+          <a:prstGeom prst="rect">
+            <a:avLst/>
+          </a:prstGeom>
+        </p:spPr>
+        <p:txBody>
+          <a:bodyPr anchorCtr="0" anchor="t" bIns="91425" lIns="91425" spcFirstLastPara="1" rIns="91425" wrap="square" tIns="91425">
+            <a:noAutofit/>
+          </a:bodyPr>
+          <a:lstStyle/>
+          <a:p>
+            <a:pPr indent="0" lvl="0" marL="0" rtl="0" algn="l">
+              <a:spcBef>
+                <a:spcPts val="0"/>
+              </a:spcBef>
+              <a:spcAft>
+                <a:spcPts val="0"/>
+              </a:spcAft>
+              <a:buNone/>
+            </a:pPr>
+            <a:r>
+              <a:t/>
+            </a:r>
+            <a:endParaRPr/>
+          </a:p>
+        </p:txBody>
+      </p:sp>
+    </p:spTree>
+  </p:cSld>
+  <p:clrMapOvr>
+    <a:masterClrMapping/>
+  </p:clrMapOvr>
+</p:notes>
+</file>
+
+<file path=ppt/notesSlides/notesSlide7.xml><?xml version="1.0" encoding="utf-8"?>
+<p:notes xmlns:a="http://schemas.openxmlformats.org/drawingml/2006/main" xmlns:r="http://schemas.openxmlformats.org/officeDocument/2006/relationships" xmlns:mc="http://schemas.openxmlformats.org/markup-compatibility/2006" xmlns:mv="urn:schemas-microsoft-com:mac:vml" xmlns:p="http://schemas.openxmlformats.org/presentationml/2006/main" xmlns:c="http://schemas.openxmlformats.org/drawingml/2006/chart" xmlns:dgm="http://schemas.openxmlformats.org/drawingml/2006/diagram" xmlns:o="urn:schemas-microsoft-com:office:office" xmlns:v="urn:schemas-microsoft-com:vml" xmlns:pvml="urn:schemas-microsoft-com:office:powerpoint" xmlns:com="http://schemas.openxmlformats.org/drawingml/2006/compatibility" xmlns:p14="http://schemas.microsoft.com/office/powerpoint/2010/main" xmlns:p15="http://schemas.microsoft.com/office/powerpoint/2012/main" xmlns:ahyp="http://schemas.microsoft.com/office/drawing/2018/hyperlinkcolor" showMasterPhAnim="0" showMasterSp="0">
+  <p:cSld>
+    <p:spTree>
+      <p:nvGrpSpPr>
+        <p:cNvPr id="169" name="Shape 169"/>
+        <p:cNvGrpSpPr/>
+        <p:nvPr/>
+      </p:nvGrpSpPr>
+      <p:grpSpPr>
+        <a:xfrm>
+          <a:off x="0" y="0"/>
+          <a:ext cx="0" cy="0"/>
+          <a:chOff x="0" y="0"/>
+          <a:chExt cx="0" cy="0"/>
+        </a:xfrm>
+      </p:grpSpPr>
+      <p:sp>
+        <p:nvSpPr>
+          <p:cNvPr id="170" name="Google Shape;170;g2a92bd0c23d_0_28:notes"/>
+          <p:cNvSpPr/>
+          <p:nvPr>
+            <p:ph idx="2" type="sldImg"/>
+          </p:nvPr>
+        </p:nvSpPr>
+        <p:spPr>
+          <a:xfrm>
+            <a:off x="381300" y="685800"/>
+            <a:ext cx="6096000" cy="3429000"/>
+          </a:xfrm>
+          <a:custGeom>
+            <a:rect b="b" l="l" r="r" t="t"/>
+            <a:pathLst>
+              <a:path extrusionOk="0" h="120000" w="120000">
+                <a:moveTo>
+                  <a:pt x="0" y="0"/>
+                </a:moveTo>
+                <a:lnTo>
+                  <a:pt x="120000" y="0"/>
+                </a:lnTo>
+                <a:lnTo>
+                  <a:pt x="120000" y="120000"/>
+                </a:lnTo>
+                <a:lnTo>
+                  <a:pt x="0" y="120000"/>
+                </a:lnTo>
+                <a:close/>
+              </a:path>
+            </a:pathLst>
+          </a:custGeom>
+        </p:spPr>
+      </p:sp>
+      <p:sp>
+        <p:nvSpPr>
+          <p:cNvPr id="171" name="Google Shape;171;g2a92bd0c23d_0_28:notes"/>
           <p:cNvSpPr txBox="1"/>
           <p:nvPr>
             <p:ph idx="1" type="body"/>
@@ -10885,7 +11285,770 @@
 </p:sld>
 </file>
 
+<file path=ppt/slides/slide4.xml><?xml version="1.0" encoding="utf-8"?>
+<p:sld xmlns:a="http://schemas.openxmlformats.org/drawingml/2006/main" xmlns:r="http://schemas.openxmlformats.org/officeDocument/2006/relationships" xmlns:mc="http://schemas.openxmlformats.org/markup-compatibility/2006" xmlns:mv="urn:schemas-microsoft-com:mac:vml" xmlns:p="http://schemas.openxmlformats.org/presentationml/2006/main" xmlns:c="http://schemas.openxmlformats.org/drawingml/2006/chart" xmlns:dgm="http://schemas.openxmlformats.org/drawingml/2006/diagram" xmlns:o="urn:schemas-microsoft-com:office:office" xmlns:v="urn:schemas-microsoft-com:vml" xmlns:pvml="urn:schemas-microsoft-com:office:powerpoint" xmlns:com="http://schemas.openxmlformats.org/drawingml/2006/compatibility" xmlns:p14="http://schemas.microsoft.com/office/powerpoint/2010/main" xmlns:p15="http://schemas.microsoft.com/office/powerpoint/2012/main" xmlns:ahyp="http://schemas.microsoft.com/office/drawing/2018/hyperlinkcolor">
+  <p:cSld>
+    <p:spTree>
+      <p:nvGrpSpPr>
+        <p:cNvPr id="152" name="Shape 152"/>
+        <p:cNvGrpSpPr/>
+        <p:nvPr/>
+      </p:nvGrpSpPr>
+      <p:grpSpPr>
+        <a:xfrm>
+          <a:off x="0" y="0"/>
+          <a:ext cx="0" cy="0"/>
+          <a:chOff x="0" y="0"/>
+          <a:chExt cx="0" cy="0"/>
+        </a:xfrm>
+      </p:grpSpPr>
+      <p:pic>
+        <p:nvPicPr>
+          <p:cNvPr id="153" name="Google Shape;153;p20"/>
+          <p:cNvPicPr preferRelativeResize="0"/>
+          <p:nvPr/>
+        </p:nvPicPr>
+        <p:blipFill>
+          <a:blip r:embed="rId3">
+            <a:alphaModFix/>
+          </a:blip>
+          <a:stretch>
+            <a:fillRect/>
+          </a:stretch>
+        </p:blipFill>
+        <p:spPr>
+          <a:xfrm>
+            <a:off x="706225" y="152400"/>
+            <a:ext cx="1776666" cy="4838701"/>
+          </a:xfrm>
+          <a:prstGeom prst="rect">
+            <a:avLst/>
+          </a:prstGeom>
+          <a:noFill/>
+          <a:ln>
+            <a:noFill/>
+          </a:ln>
+        </p:spPr>
+      </p:pic>
+      <p:cxnSp>
+        <p:nvCxnSpPr>
+          <p:cNvPr id="154" name="Google Shape;154;p20"/>
+          <p:cNvCxnSpPr/>
+          <p:nvPr/>
+        </p:nvCxnSpPr>
+        <p:spPr>
+          <a:xfrm>
+            <a:off x="2381375" y="353050"/>
+            <a:ext cx="1080000" cy="193800"/>
+          </a:xfrm>
+          <a:prstGeom prst="straightConnector1">
+            <a:avLst/>
+          </a:prstGeom>
+          <a:noFill/>
+          <a:ln cap="flat" cmpd="sng" w="38100">
+            <a:solidFill>
+              <a:schemeClr val="accent3"/>
+            </a:solidFill>
+            <a:prstDash val="solid"/>
+            <a:round/>
+            <a:headEnd len="med" w="med" type="none"/>
+            <a:tailEnd len="med" w="med" type="none"/>
+          </a:ln>
+        </p:spPr>
+      </p:cxnSp>
+      <p:cxnSp>
+        <p:nvCxnSpPr>
+          <p:cNvPr id="155" name="Google Shape;155;p20"/>
+          <p:cNvCxnSpPr/>
+          <p:nvPr/>
+        </p:nvCxnSpPr>
+        <p:spPr>
+          <a:xfrm>
+            <a:off x="2284450" y="1398375"/>
+            <a:ext cx="1183800" cy="3246600"/>
+          </a:xfrm>
+          <a:prstGeom prst="straightConnector1">
+            <a:avLst/>
+          </a:prstGeom>
+          <a:noFill/>
+          <a:ln cap="flat" cmpd="sng" w="38100">
+            <a:solidFill>
+              <a:schemeClr val="accent3"/>
+            </a:solidFill>
+            <a:prstDash val="solid"/>
+            <a:round/>
+            <a:headEnd len="med" w="med" type="none"/>
+            <a:tailEnd len="med" w="med" type="none"/>
+          </a:ln>
+        </p:spPr>
+      </p:cxnSp>
+      <p:pic>
+        <p:nvPicPr>
+          <p:cNvPr id="156" name="Google Shape;156;p20"/>
+          <p:cNvPicPr preferRelativeResize="0"/>
+          <p:nvPr/>
+        </p:nvPicPr>
+        <p:blipFill>
+          <a:blip r:embed="rId4">
+            <a:alphaModFix/>
+          </a:blip>
+          <a:stretch>
+            <a:fillRect/>
+          </a:stretch>
+        </p:blipFill>
+        <p:spPr>
+          <a:xfrm>
+            <a:off x="3454425" y="512275"/>
+            <a:ext cx="5513926" cy="4146650"/>
+          </a:xfrm>
+          <a:prstGeom prst="rect">
+            <a:avLst/>
+          </a:prstGeom>
+          <a:noFill/>
+          <a:ln>
+            <a:noFill/>
+          </a:ln>
+        </p:spPr>
+      </p:pic>
+    </p:spTree>
+  </p:cSld>
+  <p:clrMapOvr>
+    <a:masterClrMapping/>
+  </p:clrMapOvr>
+</p:sld>
+</file>
+
+<file path=ppt/slides/slide5.xml><?xml version="1.0" encoding="utf-8"?>
+<p:sld xmlns:a="http://schemas.openxmlformats.org/drawingml/2006/main" xmlns:r="http://schemas.openxmlformats.org/officeDocument/2006/relationships" xmlns:mc="http://schemas.openxmlformats.org/markup-compatibility/2006" xmlns:mv="urn:schemas-microsoft-com:mac:vml" xmlns:p="http://schemas.openxmlformats.org/presentationml/2006/main" xmlns:c="http://schemas.openxmlformats.org/drawingml/2006/chart" xmlns:dgm="http://schemas.openxmlformats.org/drawingml/2006/diagram" xmlns:o="urn:schemas-microsoft-com:office:office" xmlns:v="urn:schemas-microsoft-com:vml" xmlns:pvml="urn:schemas-microsoft-com:office:powerpoint" xmlns:com="http://schemas.openxmlformats.org/drawingml/2006/compatibility" xmlns:p14="http://schemas.microsoft.com/office/powerpoint/2010/main" xmlns:p15="http://schemas.microsoft.com/office/powerpoint/2012/main" xmlns:ahyp="http://schemas.microsoft.com/office/drawing/2018/hyperlinkcolor">
+  <p:cSld>
+    <p:spTree>
+      <p:nvGrpSpPr>
+        <p:cNvPr id="160" name="Shape 160"/>
+        <p:cNvGrpSpPr/>
+        <p:nvPr/>
+      </p:nvGrpSpPr>
+      <p:grpSpPr>
+        <a:xfrm>
+          <a:off x="0" y="0"/>
+          <a:ext cx="0" cy="0"/>
+          <a:chOff x="0" y="0"/>
+          <a:chExt cx="0" cy="0"/>
+        </a:xfrm>
+      </p:grpSpPr>
+      <p:pic>
+        <p:nvPicPr>
+          <p:cNvPr id="161" name="Google Shape;161;p21"/>
+          <p:cNvPicPr preferRelativeResize="0"/>
+          <p:nvPr/>
+        </p:nvPicPr>
+        <p:blipFill>
+          <a:blip r:embed="rId3">
+            <a:alphaModFix/>
+          </a:blip>
+          <a:stretch>
+            <a:fillRect/>
+          </a:stretch>
+        </p:blipFill>
+        <p:spPr>
+          <a:xfrm>
+            <a:off x="5278150" y="957263"/>
+            <a:ext cx="3219450" cy="3228975"/>
+          </a:xfrm>
+          <a:prstGeom prst="rect">
+            <a:avLst/>
+          </a:prstGeom>
+          <a:noFill/>
+          <a:ln>
+            <a:noFill/>
+          </a:ln>
+        </p:spPr>
+      </p:pic>
+      <p:pic>
+        <p:nvPicPr>
+          <p:cNvPr id="162" name="Google Shape;162;p21"/>
+          <p:cNvPicPr preferRelativeResize="0"/>
+          <p:nvPr/>
+        </p:nvPicPr>
+        <p:blipFill>
+          <a:blip r:embed="rId4">
+            <a:alphaModFix/>
+          </a:blip>
+          <a:stretch>
+            <a:fillRect/>
+          </a:stretch>
+        </p:blipFill>
+        <p:spPr>
+          <a:xfrm>
+            <a:off x="152400" y="750698"/>
+            <a:ext cx="4256176" cy="3550650"/>
+          </a:xfrm>
+          <a:prstGeom prst="rect">
+            <a:avLst/>
+          </a:prstGeom>
+          <a:noFill/>
+          <a:ln>
+            <a:noFill/>
+          </a:ln>
+        </p:spPr>
+      </p:pic>
+    </p:spTree>
+  </p:cSld>
+  <p:clrMapOvr>
+    <a:masterClrMapping/>
+  </p:clrMapOvr>
+</p:sld>
+</file>
+
+<file path=ppt/slides/slide6.xml><?xml version="1.0" encoding="utf-8"?>
+<p:sld xmlns:a="http://schemas.openxmlformats.org/drawingml/2006/main" xmlns:r="http://schemas.openxmlformats.org/officeDocument/2006/relationships" xmlns:mc="http://schemas.openxmlformats.org/markup-compatibility/2006" xmlns:mv="urn:schemas-microsoft-com:mac:vml" xmlns:p="http://schemas.openxmlformats.org/presentationml/2006/main" xmlns:c="http://schemas.openxmlformats.org/drawingml/2006/chart" xmlns:dgm="http://schemas.openxmlformats.org/drawingml/2006/diagram" xmlns:o="urn:schemas-microsoft-com:office:office" xmlns:v="urn:schemas-microsoft-com:vml" xmlns:pvml="urn:schemas-microsoft-com:office:powerpoint" xmlns:com="http://schemas.openxmlformats.org/drawingml/2006/compatibility" xmlns:p14="http://schemas.microsoft.com/office/powerpoint/2010/main" xmlns:p15="http://schemas.microsoft.com/office/powerpoint/2012/main" xmlns:ahyp="http://schemas.microsoft.com/office/drawing/2018/hyperlinkcolor">
+  <p:cSld>
+    <p:spTree>
+      <p:nvGrpSpPr>
+        <p:cNvPr id="166" name="Shape 166"/>
+        <p:cNvGrpSpPr/>
+        <p:nvPr/>
+      </p:nvGrpSpPr>
+      <p:grpSpPr>
+        <a:xfrm>
+          <a:off x="0" y="0"/>
+          <a:ext cx="0" cy="0"/>
+          <a:chOff x="0" y="0"/>
+          <a:chExt cx="0" cy="0"/>
+        </a:xfrm>
+      </p:grpSpPr>
+      <p:pic>
+        <p:nvPicPr>
+          <p:cNvPr id="167" name="Google Shape;167;p22"/>
+          <p:cNvPicPr preferRelativeResize="0"/>
+          <p:nvPr/>
+        </p:nvPicPr>
+        <p:blipFill>
+          <a:blip r:embed="rId3">
+            <a:alphaModFix/>
+          </a:blip>
+          <a:stretch>
+            <a:fillRect/>
+          </a:stretch>
+        </p:blipFill>
+        <p:spPr>
+          <a:xfrm>
+            <a:off x="5270075" y="942975"/>
+            <a:ext cx="3286125" cy="3257550"/>
+          </a:xfrm>
+          <a:prstGeom prst="rect">
+            <a:avLst/>
+          </a:prstGeom>
+          <a:noFill/>
+          <a:ln>
+            <a:noFill/>
+          </a:ln>
+        </p:spPr>
+      </p:pic>
+      <p:pic>
+        <p:nvPicPr>
+          <p:cNvPr id="168" name="Google Shape;168;p22"/>
+          <p:cNvPicPr preferRelativeResize="0"/>
+          <p:nvPr/>
+        </p:nvPicPr>
+        <p:blipFill>
+          <a:blip r:embed="rId4">
+            <a:alphaModFix/>
+          </a:blip>
+          <a:stretch>
+            <a:fillRect/>
+          </a:stretch>
+        </p:blipFill>
+        <p:spPr>
+          <a:xfrm>
+            <a:off x="152400" y="942975"/>
+            <a:ext cx="4212226" cy="3257550"/>
+          </a:xfrm>
+          <a:prstGeom prst="rect">
+            <a:avLst/>
+          </a:prstGeom>
+          <a:noFill/>
+          <a:ln>
+            <a:noFill/>
+          </a:ln>
+        </p:spPr>
+      </p:pic>
+    </p:spTree>
+  </p:cSld>
+  <p:clrMapOvr>
+    <a:masterClrMapping/>
+  </p:clrMapOvr>
+</p:sld>
+</file>
+
+<file path=ppt/slides/slide7.xml><?xml version="1.0" encoding="utf-8"?>
+<p:sld xmlns:a="http://schemas.openxmlformats.org/drawingml/2006/main" xmlns:r="http://schemas.openxmlformats.org/officeDocument/2006/relationships" xmlns:mc="http://schemas.openxmlformats.org/markup-compatibility/2006" xmlns:mv="urn:schemas-microsoft-com:mac:vml" xmlns:p="http://schemas.openxmlformats.org/presentationml/2006/main" xmlns:c="http://schemas.openxmlformats.org/drawingml/2006/chart" xmlns:dgm="http://schemas.openxmlformats.org/drawingml/2006/diagram" xmlns:o="urn:schemas-microsoft-com:office:office" xmlns:v="urn:schemas-microsoft-com:vml" xmlns:pvml="urn:schemas-microsoft-com:office:powerpoint" xmlns:com="http://schemas.openxmlformats.org/drawingml/2006/compatibility" xmlns:p14="http://schemas.microsoft.com/office/powerpoint/2010/main" xmlns:p15="http://schemas.microsoft.com/office/powerpoint/2012/main" xmlns:ahyp="http://schemas.microsoft.com/office/drawing/2018/hyperlinkcolor">
+  <p:cSld>
+    <p:spTree>
+      <p:nvGrpSpPr>
+        <p:cNvPr id="172" name="Shape 172"/>
+        <p:cNvGrpSpPr/>
+        <p:nvPr/>
+      </p:nvGrpSpPr>
+      <p:grpSpPr>
+        <a:xfrm>
+          <a:off x="0" y="0"/>
+          <a:ext cx="0" cy="0"/>
+          <a:chOff x="0" y="0"/>
+          <a:chExt cx="0" cy="0"/>
+        </a:xfrm>
+      </p:grpSpPr>
+      <p:pic>
+        <p:nvPicPr>
+          <p:cNvPr id="173" name="Google Shape;173;p23"/>
+          <p:cNvPicPr preferRelativeResize="0"/>
+          <p:nvPr/>
+        </p:nvPicPr>
+        <p:blipFill>
+          <a:blip r:embed="rId3">
+            <a:alphaModFix/>
+          </a:blip>
+          <a:stretch>
+            <a:fillRect/>
+          </a:stretch>
+        </p:blipFill>
+        <p:spPr>
+          <a:xfrm>
+            <a:off x="499500" y="942975"/>
+            <a:ext cx="3286125" cy="3257550"/>
+          </a:xfrm>
+          <a:prstGeom prst="rect">
+            <a:avLst/>
+          </a:prstGeom>
+          <a:noFill/>
+          <a:ln>
+            <a:noFill/>
+          </a:ln>
+        </p:spPr>
+      </p:pic>
+      <p:pic>
+        <p:nvPicPr>
+          <p:cNvPr id="174" name="Google Shape;174;p23"/>
+          <p:cNvPicPr preferRelativeResize="0"/>
+          <p:nvPr/>
+        </p:nvPicPr>
+        <p:blipFill>
+          <a:blip r:embed="rId4">
+            <a:alphaModFix/>
+          </a:blip>
+          <a:stretch>
+            <a:fillRect/>
+          </a:stretch>
+        </p:blipFill>
+        <p:spPr>
+          <a:xfrm>
+            <a:off x="208900" y="1223638"/>
+            <a:ext cx="3219450" cy="3228975"/>
+          </a:xfrm>
+          <a:prstGeom prst="rect">
+            <a:avLst/>
+          </a:prstGeom>
+          <a:noFill/>
+          <a:ln>
+            <a:noFill/>
+          </a:ln>
+        </p:spPr>
+      </p:pic>
+      <p:pic>
+        <p:nvPicPr>
+          <p:cNvPr id="175" name="Google Shape;175;p23"/>
+          <p:cNvPicPr preferRelativeResize="0"/>
+          <p:nvPr/>
+        </p:nvPicPr>
+        <p:blipFill>
+          <a:blip r:embed="rId5">
+            <a:alphaModFix/>
+          </a:blip>
+          <a:stretch>
+            <a:fillRect/>
+          </a:stretch>
+        </p:blipFill>
+        <p:spPr>
+          <a:xfrm>
+            <a:off x="4693225" y="152400"/>
+            <a:ext cx="1857229" cy="4838700"/>
+          </a:xfrm>
+          <a:prstGeom prst="rect">
+            <a:avLst/>
+          </a:prstGeom>
+          <a:noFill/>
+          <a:ln>
+            <a:noFill/>
+          </a:ln>
+        </p:spPr>
+      </p:pic>
+      <p:pic>
+        <p:nvPicPr>
+          <p:cNvPr id="176" name="Google Shape;176;p23"/>
+          <p:cNvPicPr preferRelativeResize="0"/>
+          <p:nvPr/>
+        </p:nvPicPr>
+        <p:blipFill>
+          <a:blip r:embed="rId6">
+            <a:alphaModFix/>
+          </a:blip>
+          <a:stretch>
+            <a:fillRect/>
+          </a:stretch>
+        </p:blipFill>
+        <p:spPr>
+          <a:xfrm>
+            <a:off x="6280500" y="1482649"/>
+            <a:ext cx="2693051" cy="1503376"/>
+          </a:xfrm>
+          <a:prstGeom prst="rect">
+            <a:avLst/>
+          </a:prstGeom>
+          <a:noFill/>
+          <a:ln>
+            <a:noFill/>
+          </a:ln>
+        </p:spPr>
+      </p:pic>
+      <p:cxnSp>
+        <p:nvCxnSpPr>
+          <p:cNvPr id="177" name="Google Shape;177;p23"/>
+          <p:cNvCxnSpPr/>
+          <p:nvPr/>
+        </p:nvCxnSpPr>
+        <p:spPr>
+          <a:xfrm>
+            <a:off x="6436900" y="340900"/>
+            <a:ext cx="905700" cy="1141800"/>
+          </a:xfrm>
+          <a:prstGeom prst="straightConnector1">
+            <a:avLst/>
+          </a:prstGeom>
+          <a:noFill/>
+          <a:ln cap="flat" cmpd="sng" w="28575">
+            <a:solidFill>
+              <a:schemeClr val="accent3"/>
+            </a:solidFill>
+            <a:prstDash val="solid"/>
+            <a:round/>
+            <a:headEnd len="med" w="med" type="none"/>
+            <a:tailEnd len="med" w="med" type="none"/>
+          </a:ln>
+        </p:spPr>
+      </p:cxnSp>
+      <p:cxnSp>
+        <p:nvCxnSpPr>
+          <p:cNvPr id="178" name="Google Shape;178;p23"/>
+          <p:cNvCxnSpPr/>
+          <p:nvPr/>
+        </p:nvCxnSpPr>
+        <p:spPr>
+          <a:xfrm>
+            <a:off x="5073325" y="1373600"/>
+            <a:ext cx="1303500" cy="1584300"/>
+          </a:xfrm>
+          <a:prstGeom prst="straightConnector1">
+            <a:avLst/>
+          </a:prstGeom>
+          <a:noFill/>
+          <a:ln cap="flat" cmpd="sng" w="28575">
+            <a:solidFill>
+              <a:schemeClr val="accent3"/>
+            </a:solidFill>
+            <a:prstDash val="solid"/>
+            <a:round/>
+            <a:headEnd len="med" w="med" type="none"/>
+            <a:tailEnd len="med" w="med" type="none"/>
+          </a:ln>
+        </p:spPr>
+      </p:cxnSp>
+    </p:spTree>
+  </p:cSld>
+  <p:clrMapOvr>
+    <a:masterClrMapping/>
+  </p:clrMapOvr>
+</p:sld>
+</file>
+
 <file path=ppt/theme/theme1.xml><?xml version="1.0" encoding="utf-8"?>
+<a:theme xmlns:a="http://schemas.openxmlformats.org/drawingml/2006/main" xmlns:r="http://schemas.openxmlformats.org/officeDocument/2006/relationships">
+  <a:themeElements>
+    <a:clrScheme name="Default">
+      <a:dk1>
+        <a:srgbClr val="000000"/>
+      </a:dk1>
+      <a:lt1>
+        <a:srgbClr val="FFFFFF"/>
+      </a:lt1>
+      <a:dk2>
+        <a:srgbClr val="158158"/>
+      </a:dk2>
+      <a:lt2>
+        <a:srgbClr val="F3F3F3"/>
+      </a:lt2>
+      <a:accent1>
+        <a:srgbClr val="058DC7"/>
+      </a:accent1>
+      <a:accent2>
+        <a:srgbClr val="50B432"/>
+      </a:accent2>
+      <a:accent3>
+        <a:srgbClr val="ED561B"/>
+      </a:accent3>
+      <a:accent4>
+        <a:srgbClr val="EDEF00"/>
+      </a:accent4>
+      <a:accent5>
+        <a:srgbClr val="24CBE5"/>
+      </a:accent5>
+      <a:accent6>
+        <a:srgbClr val="64E572"/>
+      </a:accent6>
+      <a:hlink>
+        <a:srgbClr val="2200CC"/>
+      </a:hlink>
+      <a:folHlink>
+        <a:srgbClr val="551A8B"/>
+      </a:folHlink>
+    </a:clrScheme>
+    <a:fontScheme name="Office">
+      <a:majorFont>
+        <a:latin typeface="Arial"/>
+        <a:ea typeface=""/>
+        <a:cs typeface=""/>
+        <a:font script="Jpan" typeface="ＭＳ Ｐゴシック"/>
+        <a:font script="Hang" typeface="맑은 고딕"/>
+        <a:font script="Hans" typeface="宋体"/>
+        <a:font script="Hant" typeface="新細明體"/>
+        <a:font script="Arab" typeface="Times New Roman"/>
+        <a:font script="Hebr" typeface="Times New Roman"/>
+        <a:font script="Thai" typeface="Angsana New"/>
+        <a:font script="Ethi" typeface="Nyala"/>
+        <a:font script="Beng" typeface="Vrinda"/>
+        <a:font script="Gujr" typeface="Shruti"/>
+        <a:font script="Khmr" typeface="MoolBoran"/>
+        <a:font script="Knda" typeface="Tunga"/>
+        <a:font script="Guru" typeface="Raavi"/>
+        <a:font script="Cans" typeface="Euphemia"/>
+        <a:font script="Cher" typeface="Plantagenet Cherokee"/>
+        <a:font script="Yiii" typeface="Microsoft Yi Baiti"/>
+        <a:font script="Tibt" typeface="Microsoft Himalaya"/>
+        <a:font script="Thaa" typeface="MV Boli"/>
+        <a:font script="Deva" typeface="Mangal"/>
+        <a:font script="Telu" typeface="Gautami"/>
+        <a:font script="Taml" typeface="Latha"/>
+        <a:font script="Syrc" typeface="Estrangelo Edessa"/>
+        <a:font script="Orya" typeface="Kalinga"/>
+        <a:font script="Mlym" typeface="Kartika"/>
+        <a:font script="Laoo" typeface="DokChampa"/>
+        <a:font script="Sinh" typeface="Iskoola Pota"/>
+        <a:font script="Mong" typeface="Mongolian Baiti"/>
+        <a:font script="Viet" typeface="Times New Roman"/>
+        <a:font script="Uigh" typeface="Microsoft Uighur"/>
+        <a:font script="Geor" typeface="Sylfaen"/>
+      </a:majorFont>
+      <a:minorFont>
+        <a:latin typeface="Arial"/>
+        <a:ea typeface=""/>
+        <a:cs typeface=""/>
+        <a:font script="Jpan" typeface="ＭＳ Ｐゴシック"/>
+        <a:font script="Hang" typeface="맑은 고딕"/>
+        <a:font script="Hans" typeface="宋体"/>
+        <a:font script="Hant" typeface="新細明體"/>
+        <a:font script="Arab" typeface="Arial"/>
+        <a:font script="Hebr" typeface="Arial"/>
+        <a:font script="Thai" typeface="Cordia New"/>
+        <a:font script="Ethi" typeface="Nyala"/>
+        <a:font script="Beng" typeface="Vrinda"/>
+        <a:font script="Gujr" typeface="Shruti"/>
+        <a:font script="Khmr" typeface="DaunPenh"/>
+        <a:font script="Knda" typeface="Tunga"/>
+        <a:font script="Guru" typeface="Raavi"/>
+        <a:font script="Cans" typeface="Euphemia"/>
+        <a:font script="Cher" typeface="Plantagenet Cherokee"/>
+        <a:font script="Yiii" typeface="Microsoft Yi Baiti"/>
+        <a:font script="Tibt" typeface="Microsoft Himalaya"/>
+        <a:font script="Thaa" typeface="MV Boli"/>
+        <a:font script="Deva" typeface="Mangal"/>
+        <a:font script="Telu" typeface="Gautami"/>
+        <a:font script="Taml" typeface="Latha"/>
+        <a:font script="Syrc" typeface="Estrangelo Edessa"/>
+        <a:font script="Orya" typeface="Kalinga"/>
+        <a:font script="Mlym" typeface="Kartika"/>
+        <a:font script="Laoo" typeface="DokChampa"/>
+        <a:font script="Sinh" typeface="Iskoola Pota"/>
+        <a:font script="Mong" typeface="Mongolian Baiti"/>
+        <a:font script="Viet" typeface="Arial"/>
+        <a:font script="Uigh" typeface="Microsoft Uighur"/>
+        <a:font script="Geor" typeface="Sylfaen"/>
+      </a:minorFont>
+    </a:fontScheme>
+    <a:fmtScheme name="Office">
+      <a:fillStyleLst>
+        <a:solidFill>
+          <a:schemeClr val="phClr"/>
+        </a:solidFill>
+        <a:gradFill rotWithShape="1">
+          <a:gsLst>
+            <a:gs pos="0">
+              <a:schemeClr val="phClr">
+                <a:tint val="50000"/>
+                <a:satMod val="300000"/>
+              </a:schemeClr>
+            </a:gs>
+            <a:gs pos="35000">
+              <a:schemeClr val="phClr">
+                <a:tint val="37000"/>
+                <a:satMod val="300000"/>
+              </a:schemeClr>
+            </a:gs>
+            <a:gs pos="100000">
+              <a:schemeClr val="phClr">
+                <a:tint val="15000"/>
+                <a:satMod val="350000"/>
+              </a:schemeClr>
+            </a:gs>
+          </a:gsLst>
+          <a:lin ang="16200000" scaled="1"/>
+        </a:gradFill>
+        <a:gradFill rotWithShape="1">
+          <a:gsLst>
+            <a:gs pos="0">
+              <a:schemeClr val="phClr">
+                <a:tint val="100000"/>
+                <a:shade val="100000"/>
+                <a:satMod val="130000"/>
+              </a:schemeClr>
+            </a:gs>
+            <a:gs pos="100000">
+              <a:schemeClr val="phClr">
+                <a:tint val="50000"/>
+                <a:shade val="100000"/>
+                <a:satMod val="350000"/>
+              </a:schemeClr>
+            </a:gs>
+          </a:gsLst>
+          <a:lin ang="16200000" scaled="0"/>
+        </a:gradFill>
+      </a:fillStyleLst>
+      <a:lnStyleLst>
+        <a:ln w="9525" cap="flat" cmpd="sng" algn="ctr">
+          <a:solidFill>
+            <a:schemeClr val="phClr">
+              <a:shade val="95000"/>
+              <a:satMod val="105000"/>
+            </a:schemeClr>
+          </a:solidFill>
+          <a:prstDash val="solid"/>
+        </a:ln>
+        <a:ln w="25400" cap="flat" cmpd="sng" algn="ctr">
+          <a:solidFill>
+            <a:schemeClr val="phClr"/>
+          </a:solidFill>
+          <a:prstDash val="solid"/>
+        </a:ln>
+        <a:ln w="38100" cap="flat" cmpd="sng" algn="ctr">
+          <a:solidFill>
+            <a:schemeClr val="phClr"/>
+          </a:solidFill>
+          <a:prstDash val="solid"/>
+        </a:ln>
+      </a:lnStyleLst>
+      <a:effectStyleLst>
+        <a:effectStyle>
+          <a:effectLst>
+            <a:outerShdw blurRad="40000" dist="20000" dir="5400000" rotWithShape="0">
+              <a:srgbClr val="000000">
+                <a:alpha val="38000"/>
+              </a:srgbClr>
+            </a:outerShdw>
+          </a:effectLst>
+        </a:effectStyle>
+        <a:effectStyle>
+          <a:effectLst>
+            <a:outerShdw blurRad="40000" dist="23000" dir="5400000" rotWithShape="0">
+              <a:srgbClr val="000000">
+                <a:alpha val="35000"/>
+              </a:srgbClr>
+            </a:outerShdw>
+          </a:effectLst>
+        </a:effectStyle>
+        <a:effectStyle>
+          <a:effectLst>
+            <a:outerShdw blurRad="40000" dist="23000" dir="5400000" rotWithShape="0">
+              <a:srgbClr val="000000">
+                <a:alpha val="35000"/>
+              </a:srgbClr>
+            </a:outerShdw>
+          </a:effectLst>
+          <a:scene3d>
+            <a:camera prst="orthographicFront">
+              <a:rot lat="0" lon="0" rev="0"/>
+            </a:camera>
+            <a:lightRig rig="threePt" dir="t">
+              <a:rot lat="0" lon="0" rev="1200000"/>
+            </a:lightRig>
+          </a:scene3d>
+          <a:sp3d>
+            <a:bevelT w="63500" h="25400"/>
+          </a:sp3d>
+        </a:effectStyle>
+      </a:effectStyleLst>
+      <a:bgFillStyleLst>
+        <a:solidFill>
+          <a:schemeClr val="phClr"/>
+        </a:solidFill>
+        <a:gradFill rotWithShape="1">
+          <a:gsLst>
+            <a:gs pos="0">
+              <a:schemeClr val="phClr">
+                <a:tint val="40000"/>
+                <a:satMod val="350000"/>
+              </a:schemeClr>
+            </a:gs>
+            <a:gs pos="40000">
+              <a:schemeClr val="phClr">
+                <a:tint val="45000"/>
+                <a:shade val="99000"/>
+                <a:satMod val="350000"/>
+              </a:schemeClr>
+            </a:gs>
+            <a:gs pos="100000">
+              <a:schemeClr val="phClr">
+                <a:shade val="20000"/>
+                <a:satMod val="255000"/>
+              </a:schemeClr>
+            </a:gs>
+          </a:gsLst>
+          <a:path path="circle">
+            <a:fillToRect l="50000" t="-80000" r="50000" b="180000"/>
+          </a:path>
+        </a:gradFill>
+        <a:gradFill rotWithShape="1">
+          <a:gsLst>
+            <a:gs pos="0">
+              <a:schemeClr val="phClr">
+                <a:tint val="80000"/>
+                <a:satMod val="300000"/>
+              </a:schemeClr>
+            </a:gs>
+            <a:gs pos="100000">
+              <a:schemeClr val="phClr">
+                <a:shade val="30000"/>
+                <a:satMod val="200000"/>
+              </a:schemeClr>
+            </a:gs>
+          </a:gsLst>
+          <a:path path="circle">
+            <a:fillToRect l="50000" t="50000" r="50000" b="50000"/>
+          </a:path>
+        </a:gradFill>
+      </a:bgFillStyleLst>
+    </a:fmtScheme>
+  </a:themeElements>
+</a:theme>
+</file>
+
+<file path=ppt/theme/theme2.xml><?xml version="1.0" encoding="utf-8"?>
 <a:theme xmlns:a="http://schemas.openxmlformats.org/drawingml/2006/main" xmlns:r="http://schemas.openxmlformats.org/officeDocument/2006/relationships" name="Streamline">
   <a:themeElements>
     <a:clrScheme name="Streamline">
@@ -11162,283 +12325,4 @@
     </a:fmtScheme>
   </a:themeElements>
 </a:theme>
-</file>
-
-<file path=ppt/theme/theme2.xml><?xml version="1.0" encoding="utf-8"?>
-<a:theme xmlns:a="http://schemas.openxmlformats.org/drawingml/2006/main" xmlns:r="http://schemas.openxmlformats.org/officeDocument/2006/relationships">
-  <a:themeElements>
-    <a:clrScheme name="Default">
-      <a:dk1>
-        <a:srgbClr val="000000"/>
-      </a:dk1>
-      <a:lt1>
-        <a:srgbClr val="FFFFFF"/>
-      </a:lt1>
-      <a:dk2>
-        <a:srgbClr val="158158"/>
-      </a:dk2>
-      <a:lt2>
-        <a:srgbClr val="F3F3F3"/>
-      </a:lt2>
-      <a:accent1>
-        <a:srgbClr val="058DC7"/>
-      </a:accent1>
-      <a:accent2>
-        <a:srgbClr val="50B432"/>
-      </a:accent2>
-      <a:accent3>
-        <a:srgbClr val="ED561B"/>
-      </a:accent3>
-      <a:accent4>
-        <a:srgbClr val="EDEF00"/>
-      </a:accent4>
-      <a:accent5>
-        <a:srgbClr val="24CBE5"/>
-      </a:accent5>
-      <a:accent6>
-        <a:srgbClr val="64E572"/>
-      </a:accent6>
-      <a:hlink>
-        <a:srgbClr val="2200CC"/>
-      </a:hlink>
-      <a:folHlink>
-        <a:srgbClr val="551A8B"/>
-      </a:folHlink>
-    </a:clrScheme>
-    <a:fontScheme name="Office">
-      <a:majorFont>
-        <a:latin typeface="Arial"/>
-        <a:ea typeface=""/>
-        <a:cs typeface=""/>
-        <a:font script="Jpan" typeface="ＭＳ Ｐゴシック"/>
-        <a:font script="Hang" typeface="맑은 고딕"/>
-        <a:font script="Hans" typeface="宋体"/>
-        <a:font script="Hant" typeface="新細明體"/>
-        <a:font script="Arab" typeface="Times New Roman"/>
-        <a:font script="Hebr" typeface="Times New Roman"/>
-        <a:font script="Thai" typeface="Angsana New"/>
-        <a:font script="Ethi" typeface="Nyala"/>
-        <a:font script="Beng" typeface="Vrinda"/>
-        <a:font script="Gujr" typeface="Shruti"/>
-        <a:font script="Khmr" typeface="MoolBoran"/>
-        <a:font script="Knda" typeface="Tunga"/>
-        <a:font script="Guru" typeface="Raavi"/>
-        <a:font script="Cans" typeface="Euphemia"/>
-        <a:font script="Cher" typeface="Plantagenet Cherokee"/>
-        <a:font script="Yiii" typeface="Microsoft Yi Baiti"/>
-        <a:font script="Tibt" typeface="Microsoft Himalaya"/>
-        <a:font script="Thaa" typeface="MV Boli"/>
-        <a:font script="Deva" typeface="Mangal"/>
-        <a:font script="Telu" typeface="Gautami"/>
-        <a:font script="Taml" typeface="Latha"/>
-        <a:font script="Syrc" typeface="Estrangelo Edessa"/>
-        <a:font script="Orya" typeface="Kalinga"/>
-        <a:font script="Mlym" typeface="Kartika"/>
-        <a:font script="Laoo" typeface="DokChampa"/>
-        <a:font script="Sinh" typeface="Iskoola Pota"/>
-        <a:font script="Mong" typeface="Mongolian Baiti"/>
-        <a:font script="Viet" typeface="Times New Roman"/>
-        <a:font script="Uigh" typeface="Microsoft Uighur"/>
-        <a:font script="Geor" typeface="Sylfaen"/>
-      </a:majorFont>
-      <a:minorFont>
-        <a:latin typeface="Arial"/>
-        <a:ea typeface=""/>
-        <a:cs typeface=""/>
-        <a:font script="Jpan" typeface="ＭＳ Ｐゴシック"/>
-        <a:font script="Hang" typeface="맑은 고딕"/>
-        <a:font script="Hans" typeface="宋体"/>
-        <a:font script="Hant" typeface="新細明體"/>
-        <a:font script="Arab" typeface="Arial"/>
-        <a:font script="Hebr" typeface="Arial"/>
-        <a:font script="Thai" typeface="Cordia New"/>
-        <a:font script="Ethi" typeface="Nyala"/>
-        <a:font script="Beng" typeface="Vrinda"/>
-        <a:font script="Gujr" typeface="Shruti"/>
-        <a:font script="Khmr" typeface="DaunPenh"/>
-        <a:font script="Knda" typeface="Tunga"/>
-        <a:font script="Guru" typeface="Raavi"/>
-        <a:font script="Cans" typeface="Euphemia"/>
-        <a:font script="Cher" typeface="Plantagenet Cherokee"/>
-        <a:font script="Yiii" typeface="Microsoft Yi Baiti"/>
-        <a:font script="Tibt" typeface="Microsoft Himalaya"/>
-        <a:font script="Thaa" typeface="MV Boli"/>
-        <a:font script="Deva" typeface="Mangal"/>
-        <a:font script="Telu" typeface="Gautami"/>
-        <a:font script="Taml" typeface="Latha"/>
-        <a:font script="Syrc" typeface="Estrangelo Edessa"/>
-        <a:font script="Orya" typeface="Kalinga"/>
-        <a:font script="Mlym" typeface="Kartika"/>
-        <a:font script="Laoo" typeface="DokChampa"/>
-        <a:font script="Sinh" typeface="Iskoola Pota"/>
-        <a:font script="Mong" typeface="Mongolian Baiti"/>
-        <a:font script="Viet" typeface="Arial"/>
-        <a:font script="Uigh" typeface="Microsoft Uighur"/>
-        <a:font script="Geor" typeface="Sylfaen"/>
-      </a:minorFont>
-    </a:fontScheme>
-    <a:fmtScheme name="Office">
-      <a:fillStyleLst>
-        <a:solidFill>
-          <a:schemeClr val="phClr"/>
-        </a:solidFill>
-        <a:gradFill rotWithShape="1">
-          <a:gsLst>
-            <a:gs pos="0">
-              <a:schemeClr val="phClr">
-                <a:tint val="50000"/>
-                <a:satMod val="300000"/>
-              </a:schemeClr>
-            </a:gs>
-            <a:gs pos="35000">
-              <a:schemeClr val="phClr">
-                <a:tint val="37000"/>
-                <a:satMod val="300000"/>
-              </a:schemeClr>
-            </a:gs>
-            <a:gs pos="100000">
-              <a:schemeClr val="phClr">
-                <a:tint val="15000"/>
-                <a:satMod val="350000"/>
-              </a:schemeClr>
-            </a:gs>
-          </a:gsLst>
-          <a:lin ang="16200000" scaled="1"/>
-        </a:gradFill>
-        <a:gradFill rotWithShape="1">
-          <a:gsLst>
-            <a:gs pos="0">
-              <a:schemeClr val="phClr">
-                <a:tint val="100000"/>
-                <a:shade val="100000"/>
-                <a:satMod val="130000"/>
-              </a:schemeClr>
-            </a:gs>
-            <a:gs pos="100000">
-              <a:schemeClr val="phClr">
-                <a:tint val="50000"/>
-                <a:shade val="100000"/>
-                <a:satMod val="350000"/>
-              </a:schemeClr>
-            </a:gs>
-          </a:gsLst>
-          <a:lin ang="16200000" scaled="0"/>
-        </a:gradFill>
-      </a:fillStyleLst>
-      <a:lnStyleLst>
-        <a:ln w="9525" cap="flat" cmpd="sng" algn="ctr">
-          <a:solidFill>
-            <a:schemeClr val="phClr">
-              <a:shade val="95000"/>
-              <a:satMod val="105000"/>
-            </a:schemeClr>
-          </a:solidFill>
-          <a:prstDash val="solid"/>
-        </a:ln>
-        <a:ln w="25400" cap="flat" cmpd="sng" algn="ctr">
-          <a:solidFill>
-            <a:schemeClr val="phClr"/>
-          </a:solidFill>
-          <a:prstDash val="solid"/>
-        </a:ln>
-        <a:ln w="38100" cap="flat" cmpd="sng" algn="ctr">
-          <a:solidFill>
-            <a:schemeClr val="phClr"/>
-          </a:solidFill>
-          <a:prstDash val="solid"/>
-        </a:ln>
-      </a:lnStyleLst>
-      <a:effectStyleLst>
-        <a:effectStyle>
-          <a:effectLst>
-            <a:outerShdw blurRad="40000" dist="20000" dir="5400000" rotWithShape="0">
-              <a:srgbClr val="000000">
-                <a:alpha val="38000"/>
-              </a:srgbClr>
-            </a:outerShdw>
-          </a:effectLst>
-        </a:effectStyle>
-        <a:effectStyle>
-          <a:effectLst>
-            <a:outerShdw blurRad="40000" dist="23000" dir="5400000" rotWithShape="0">
-              <a:srgbClr val="000000">
-                <a:alpha val="35000"/>
-              </a:srgbClr>
-            </a:outerShdw>
-          </a:effectLst>
-        </a:effectStyle>
-        <a:effectStyle>
-          <a:effectLst>
-            <a:outerShdw blurRad="40000" dist="23000" dir="5400000" rotWithShape="0">
-              <a:srgbClr val="000000">
-                <a:alpha val="35000"/>
-              </a:srgbClr>
-            </a:outerShdw>
-          </a:effectLst>
-          <a:scene3d>
-            <a:camera prst="orthographicFront">
-              <a:rot lat="0" lon="0" rev="0"/>
-            </a:camera>
-            <a:lightRig rig="threePt" dir="t">
-              <a:rot lat="0" lon="0" rev="1200000"/>
-            </a:lightRig>
-          </a:scene3d>
-          <a:sp3d>
-            <a:bevelT w="63500" h="25400"/>
-          </a:sp3d>
-        </a:effectStyle>
-      </a:effectStyleLst>
-      <a:bgFillStyleLst>
-        <a:solidFill>
-          <a:schemeClr val="phClr"/>
-        </a:solidFill>
-        <a:gradFill rotWithShape="1">
-          <a:gsLst>
-            <a:gs pos="0">
-              <a:schemeClr val="phClr">
-                <a:tint val="40000"/>
-                <a:satMod val="350000"/>
-              </a:schemeClr>
-            </a:gs>
-            <a:gs pos="40000">
-              <a:schemeClr val="phClr">
-                <a:tint val="45000"/>
-                <a:shade val="99000"/>
-                <a:satMod val="350000"/>
-              </a:schemeClr>
-            </a:gs>
-            <a:gs pos="100000">
-              <a:schemeClr val="phClr">
-                <a:shade val="20000"/>
-                <a:satMod val="255000"/>
-              </a:schemeClr>
-            </a:gs>
-          </a:gsLst>
-          <a:path path="circle">
-            <a:fillToRect l="50000" t="-80000" r="50000" b="180000"/>
-          </a:path>
-        </a:gradFill>
-        <a:gradFill rotWithShape="1">
-          <a:gsLst>
-            <a:gs pos="0">
-              <a:schemeClr val="phClr">
-                <a:tint val="80000"/>
-                <a:satMod val="300000"/>
-              </a:schemeClr>
-            </a:gs>
-            <a:gs pos="100000">
-              <a:schemeClr val="phClr">
-                <a:shade val="30000"/>
-                <a:satMod val="200000"/>
-              </a:schemeClr>
-            </a:gs>
-          </a:gsLst>
-          <a:path path="circle">
-            <a:fillToRect l="50000" t="50000" r="50000" b="50000"/>
-          </a:path>
-        </a:gradFill>
-      </a:bgFillStyleLst>
-    </a:fmtScheme>
-  </a:themeElements>
-</a:theme>
 </file>
</xml_diff>